<commit_message>
Zipkin + pptx update
</commit_message>
<xml_diff>
--- a/Coding Kitchen - Distributed data through transactional messaging patterns.pptx
+++ b/Coding Kitchen - Distributed data through transactional messaging patterns.pptx
@@ -9881,31 +9881,41 @@
           <a:chExt cx="0" cy="0"/>
         </a:xfrm>
       </p:grpSpPr>
-      <p:sp>
-        <p:nvSpPr>
-          <p:cNvPr id="3" name="Content Placeholder 2">
-            <a:extLst>
-              <a:ext uri="{FF2B5EF4-FFF2-40B4-BE49-F238E27FC236}">
-                <a16:creationId xmlns:a16="http://schemas.microsoft.com/office/drawing/2014/main" id="{6DB9CE02-8770-430D-8A0B-C855944CA5BE}"/>
-              </a:ext>
-            </a:extLst>
-          </p:cNvPr>
-          <p:cNvSpPr>
-            <a:spLocks noGrp="1"/>
-          </p:cNvSpPr>
+      <p:pic>
+        <p:nvPicPr>
+          <p:cNvPr id="5" name="Content Placeholder 4">
+            <a:extLst>
+              <a:ext uri="{FF2B5EF4-FFF2-40B4-BE49-F238E27FC236}">
+                <a16:creationId xmlns:a16="http://schemas.microsoft.com/office/drawing/2014/main" id="{3E5DD574-C4C3-4342-A88C-402B1FA35B1C}"/>
+              </a:ext>
+            </a:extLst>
+          </p:cNvPr>
+          <p:cNvPicPr>
+            <a:picLocks noGrp="1" noChangeAspect="1"/>
+          </p:cNvPicPr>
           <p:nvPr>
             <p:ph idx="1"/>
           </p:nvPr>
-        </p:nvSpPr>
-        <p:spPr/>
-        <p:txBody>
-          <a:bodyPr/>
-          <a:lstStyle/>
-          <a:p>
-            <a:endParaRPr lang="uk-UA" dirty="0"/>
-          </a:p>
-        </p:txBody>
-      </p:sp>
+        </p:nvPicPr>
+        <p:blipFill>
+          <a:blip r:embed="rId2">
+            <a:extLst>
+              <a:ext uri="{28A0092B-C50C-407E-A947-70E740481C1C}">
+                <a14:useLocalDpi xmlns:a14="http://schemas.microsoft.com/office/drawing/2010/main" val="0"/>
+              </a:ext>
+            </a:extLst>
+          </a:blip>
+          <a:stretch>
+            <a:fillRect/>
+          </a:stretch>
+        </p:blipFill>
+        <p:spPr>
+          <a:xfrm>
+            <a:off x="838200" y="2034980"/>
+            <a:ext cx="10515600" cy="3932628"/>
+          </a:xfrm>
+        </p:spPr>
+      </p:pic>
       <p:sp>
         <p:nvSpPr>
           <p:cNvPr id="2" name="Title 1">
@@ -9933,7 +9943,7 @@
                   <a:schemeClr val="tx1"/>
                 </a:solidFill>
               </a:rPr>
-              <a:t>TODO: current state diagram</a:t>
+              <a:t>Where are we?</a:t>
             </a:r>
             <a:endParaRPr lang="uk-UA" dirty="0">
               <a:solidFill>
@@ -10055,31 +10065,41 @@
           <a:chExt cx="0" cy="0"/>
         </a:xfrm>
       </p:grpSpPr>
-      <p:sp>
-        <p:nvSpPr>
-          <p:cNvPr id="3" name="Content Placeholder 2">
-            <a:extLst>
-              <a:ext uri="{FF2B5EF4-FFF2-40B4-BE49-F238E27FC236}">
-                <a16:creationId xmlns:a16="http://schemas.microsoft.com/office/drawing/2014/main" id="{6DB9CE02-8770-430D-8A0B-C855944CA5BE}"/>
-              </a:ext>
-            </a:extLst>
-          </p:cNvPr>
-          <p:cNvSpPr>
-            <a:spLocks noGrp="1"/>
-          </p:cNvSpPr>
+      <p:pic>
+        <p:nvPicPr>
+          <p:cNvPr id="5" name="Content Placeholder 4">
+            <a:extLst>
+              <a:ext uri="{FF2B5EF4-FFF2-40B4-BE49-F238E27FC236}">
+                <a16:creationId xmlns:a16="http://schemas.microsoft.com/office/drawing/2014/main" id="{6EAA88E8-1946-40C3-BFA6-E8DF9EEDA7A2}"/>
+              </a:ext>
+            </a:extLst>
+          </p:cNvPr>
+          <p:cNvPicPr>
+            <a:picLocks noGrp="1" noChangeAspect="1"/>
+          </p:cNvPicPr>
           <p:nvPr>
             <p:ph idx="1"/>
           </p:nvPr>
-        </p:nvSpPr>
-        <p:spPr/>
-        <p:txBody>
-          <a:bodyPr/>
-          <a:lstStyle/>
-          <a:p>
-            <a:endParaRPr lang="uk-UA" dirty="0"/>
-          </a:p>
-        </p:txBody>
-      </p:sp>
+        </p:nvPicPr>
+        <p:blipFill>
+          <a:blip r:embed="rId2">
+            <a:extLst>
+              <a:ext uri="{28A0092B-C50C-407E-A947-70E740481C1C}">
+                <a14:useLocalDpi xmlns:a14="http://schemas.microsoft.com/office/drawing/2010/main" val="0"/>
+              </a:ext>
+            </a:extLst>
+          </a:blip>
+          <a:stretch>
+            <a:fillRect/>
+          </a:stretch>
+        </p:blipFill>
+        <p:spPr>
+          <a:xfrm>
+            <a:off x="838200" y="2326558"/>
+            <a:ext cx="10515600" cy="3349471"/>
+          </a:xfrm>
+        </p:spPr>
+      </p:pic>
       <p:sp>
         <p:nvSpPr>
           <p:cNvPr id="2" name="Title 1">
@@ -10107,7 +10127,7 @@
                   <a:schemeClr val="tx1"/>
                 </a:solidFill>
               </a:rPr>
-              <a:t>TODO: current state diagram</a:t>
+              <a:t>Where are we?</a:t>
             </a:r>
             <a:endParaRPr lang="uk-UA" dirty="0">
               <a:solidFill>
@@ -10214,31 +10234,41 @@
           <a:chExt cx="0" cy="0"/>
         </a:xfrm>
       </p:grpSpPr>
-      <p:sp>
-        <p:nvSpPr>
-          <p:cNvPr id="3" name="Content Placeholder 2">
-            <a:extLst>
-              <a:ext uri="{FF2B5EF4-FFF2-40B4-BE49-F238E27FC236}">
-                <a16:creationId xmlns:a16="http://schemas.microsoft.com/office/drawing/2014/main" id="{6DB9CE02-8770-430D-8A0B-C855944CA5BE}"/>
-              </a:ext>
-            </a:extLst>
-          </p:cNvPr>
-          <p:cNvSpPr>
-            <a:spLocks noGrp="1"/>
-          </p:cNvSpPr>
+      <p:pic>
+        <p:nvPicPr>
+          <p:cNvPr id="5" name="Content Placeholder 4">
+            <a:extLst>
+              <a:ext uri="{FF2B5EF4-FFF2-40B4-BE49-F238E27FC236}">
+                <a16:creationId xmlns:a16="http://schemas.microsoft.com/office/drawing/2014/main" id="{5CD327F1-56F0-4C11-915F-BD06DA9D5B73}"/>
+              </a:ext>
+            </a:extLst>
+          </p:cNvPr>
+          <p:cNvPicPr>
+            <a:picLocks noGrp="1" noChangeAspect="1"/>
+          </p:cNvPicPr>
           <p:nvPr>
             <p:ph idx="1"/>
           </p:nvPr>
-        </p:nvSpPr>
-        <p:spPr/>
-        <p:txBody>
-          <a:bodyPr/>
-          <a:lstStyle/>
-          <a:p>
-            <a:endParaRPr lang="uk-UA" dirty="0"/>
-          </a:p>
-        </p:txBody>
-      </p:sp>
+        </p:nvPicPr>
+        <p:blipFill>
+          <a:blip r:embed="rId2">
+            <a:extLst>
+              <a:ext uri="{28A0092B-C50C-407E-A947-70E740481C1C}">
+                <a14:useLocalDpi xmlns:a14="http://schemas.microsoft.com/office/drawing/2010/main" val="0"/>
+              </a:ext>
+            </a:extLst>
+          </a:blip>
+          <a:stretch>
+            <a:fillRect/>
+          </a:stretch>
+        </p:blipFill>
+        <p:spPr>
+          <a:xfrm>
+            <a:off x="1216503" y="1825625"/>
+            <a:ext cx="9758994" cy="4351338"/>
+          </a:xfrm>
+        </p:spPr>
+      </p:pic>
       <p:sp>
         <p:nvSpPr>
           <p:cNvPr id="2" name="Title 1">
@@ -10266,7 +10296,7 @@
                   <a:schemeClr val="tx1"/>
                 </a:solidFill>
               </a:rPr>
-              <a:t>TODO: current state diagram</a:t>
+              <a:t>Done!</a:t>
             </a:r>
             <a:endParaRPr lang="uk-UA" dirty="0">
               <a:solidFill>

</xml_diff>